<commit_message>
minor updates to lecture 2 review
</commit_message>
<xml_diff>
--- a/review/lecture-review-week-2.pptx
+++ b/review/lecture-review-week-2.pptx
@@ -12,9 +12,8 @@
     <p:sldId id="261" r:id="rId6"/>
     <p:sldId id="262" r:id="rId7"/>
     <p:sldId id="263" r:id="rId8"/>
-    <p:sldId id="264" r:id="rId9"/>
-    <p:sldId id="265" r:id="rId10"/>
-    <p:sldId id="267" r:id="rId11"/>
+    <p:sldId id="265" r:id="rId9"/>
+    <p:sldId id="267" r:id="rId10"/>
   </p:sldIdLst>
   <p:sldSz cx="12192000" cy="6858000"/>
   <p:notesSz cx="6858000" cy="9144000"/>
@@ -268,7 +267,7 @@
           <a:p>
             <a:fld id="{BCCA4D00-8A20-4344-9629-C2410E08CC07}" type="datetimeFigureOut">
               <a:rPr lang="en-US" smtClean="0"/>
-              <a:t>8/19/18</a:t>
+              <a:t>9/16/18</a:t>
             </a:fld>
             <a:endParaRPr lang="en-US"/>
           </a:p>
@@ -466,7 +465,7 @@
           <a:p>
             <a:fld id="{BCCA4D00-8A20-4344-9629-C2410E08CC07}" type="datetimeFigureOut">
               <a:rPr lang="en-US" smtClean="0"/>
-              <a:t>8/19/18</a:t>
+              <a:t>9/16/18</a:t>
             </a:fld>
             <a:endParaRPr lang="en-US"/>
           </a:p>
@@ -674,7 +673,7 @@
           <a:p>
             <a:fld id="{BCCA4D00-8A20-4344-9629-C2410E08CC07}" type="datetimeFigureOut">
               <a:rPr lang="en-US" smtClean="0"/>
-              <a:t>8/19/18</a:t>
+              <a:t>9/16/18</a:t>
             </a:fld>
             <a:endParaRPr lang="en-US"/>
           </a:p>
@@ -872,7 +871,7 @@
           <a:p>
             <a:fld id="{BCCA4D00-8A20-4344-9629-C2410E08CC07}" type="datetimeFigureOut">
               <a:rPr lang="en-US" smtClean="0"/>
-              <a:t>8/19/18</a:t>
+              <a:t>9/16/18</a:t>
             </a:fld>
             <a:endParaRPr lang="en-US"/>
           </a:p>
@@ -1147,7 +1146,7 @@
           <a:p>
             <a:fld id="{BCCA4D00-8A20-4344-9629-C2410E08CC07}" type="datetimeFigureOut">
               <a:rPr lang="en-US" smtClean="0"/>
-              <a:t>8/19/18</a:t>
+              <a:t>9/16/18</a:t>
             </a:fld>
             <a:endParaRPr lang="en-US"/>
           </a:p>
@@ -1412,7 +1411,7 @@
           <a:p>
             <a:fld id="{BCCA4D00-8A20-4344-9629-C2410E08CC07}" type="datetimeFigureOut">
               <a:rPr lang="en-US" smtClean="0"/>
-              <a:t>8/19/18</a:t>
+              <a:t>9/16/18</a:t>
             </a:fld>
             <a:endParaRPr lang="en-US"/>
           </a:p>
@@ -1824,7 +1823,7 @@
           <a:p>
             <a:fld id="{BCCA4D00-8A20-4344-9629-C2410E08CC07}" type="datetimeFigureOut">
               <a:rPr lang="en-US" smtClean="0"/>
-              <a:t>8/19/18</a:t>
+              <a:t>9/16/18</a:t>
             </a:fld>
             <a:endParaRPr lang="en-US"/>
           </a:p>
@@ -1965,7 +1964,7 @@
           <a:p>
             <a:fld id="{BCCA4D00-8A20-4344-9629-C2410E08CC07}" type="datetimeFigureOut">
               <a:rPr lang="en-US" smtClean="0"/>
-              <a:t>8/19/18</a:t>
+              <a:t>9/16/18</a:t>
             </a:fld>
             <a:endParaRPr lang="en-US"/>
           </a:p>
@@ -2078,7 +2077,7 @@
           <a:p>
             <a:fld id="{BCCA4D00-8A20-4344-9629-C2410E08CC07}" type="datetimeFigureOut">
               <a:rPr lang="en-US" smtClean="0"/>
-              <a:t>8/19/18</a:t>
+              <a:t>9/16/18</a:t>
             </a:fld>
             <a:endParaRPr lang="en-US"/>
           </a:p>
@@ -2389,7 +2388,7 @@
           <a:p>
             <a:fld id="{BCCA4D00-8A20-4344-9629-C2410E08CC07}" type="datetimeFigureOut">
               <a:rPr lang="en-US" smtClean="0"/>
-              <a:t>8/19/18</a:t>
+              <a:t>9/16/18</a:t>
             </a:fld>
             <a:endParaRPr lang="en-US"/>
           </a:p>
@@ -2677,7 +2676,7 @@
           <a:p>
             <a:fld id="{BCCA4D00-8A20-4344-9629-C2410E08CC07}" type="datetimeFigureOut">
               <a:rPr lang="en-US" smtClean="0"/>
-              <a:t>8/19/18</a:t>
+              <a:t>9/16/18</a:t>
             </a:fld>
             <a:endParaRPr lang="en-US"/>
           </a:p>
@@ -2918,7 +2917,7 @@
           <a:p>
             <a:fld id="{BCCA4D00-8A20-4344-9629-C2410E08CC07}" type="datetimeFigureOut">
               <a:rPr lang="en-US" smtClean="0"/>
-              <a:t>8/19/18</a:t>
+              <a:t>9/16/18</a:t>
             </a:fld>
             <a:endParaRPr lang="en-US"/>
           </a:p>
@@ -3476,158 +3475,6 @@
 </p:sld>
 </file>
 
-<file path=ppt/slides/slide10.xml><?xml version="1.0" encoding="utf-8"?>
-<p:sld xmlns:a="http://schemas.openxmlformats.org/drawingml/2006/main" xmlns:r="http://schemas.openxmlformats.org/officeDocument/2006/relationships" xmlns:p="http://schemas.openxmlformats.org/presentationml/2006/main">
-  <p:cSld>
-    <p:spTree>
-      <p:nvGrpSpPr>
-        <p:cNvPr id="1" name=""/>
-        <p:cNvGrpSpPr/>
-        <p:nvPr/>
-      </p:nvGrpSpPr>
-      <p:grpSpPr>
-        <a:xfrm>
-          <a:off x="0" y="0"/>
-          <a:ext cx="0" cy="0"/>
-          <a:chOff x="0" y="0"/>
-          <a:chExt cx="0" cy="0"/>
-        </a:xfrm>
-      </p:grpSpPr>
-      <p:sp>
-        <p:nvSpPr>
-          <p:cNvPr id="2" name="Title 1"/>
-          <p:cNvSpPr>
-            <a:spLocks noGrp="1"/>
-          </p:cNvSpPr>
-          <p:nvPr>
-            <p:ph type="title"/>
-          </p:nvPr>
-        </p:nvSpPr>
-        <p:spPr/>
-        <p:txBody>
-          <a:bodyPr/>
-          <a:lstStyle/>
-          <a:p>
-            <a:r>
-              <a:rPr lang="en-US" dirty="0"/>
-              <a:t>Homework</a:t>
-            </a:r>
-          </a:p>
-        </p:txBody>
-      </p:sp>
-      <p:sp>
-        <p:nvSpPr>
-          <p:cNvPr id="3" name="Content Placeholder 2"/>
-          <p:cNvSpPr>
-            <a:spLocks noGrp="1"/>
-          </p:cNvSpPr>
-          <p:nvPr>
-            <p:ph idx="1"/>
-          </p:nvPr>
-        </p:nvSpPr>
-        <p:spPr/>
-        <p:txBody>
-          <a:bodyPr/>
-          <a:lstStyle/>
-          <a:p>
-            <a:r>
-              <a:rPr lang="en-US" dirty="0"/>
-              <a:t>Assignment 2: Shell scripting</a:t>
-            </a:r>
-          </a:p>
-          <a:p>
-            <a:r>
-              <a:rPr lang="en-US" dirty="0"/>
-              <a:t>Read </a:t>
-            </a:r>
-            <a:r>
-              <a:rPr lang="en-US" i="1" dirty="0"/>
-              <a:t>Infrastructure as Code </a:t>
-            </a:r>
-            <a:r>
-              <a:rPr lang="en-US" dirty="0"/>
-              <a:t>Chapters 1 &amp; 2</a:t>
-            </a:r>
-          </a:p>
-          <a:p>
-            <a:r>
-              <a:rPr lang="en-US" dirty="0"/>
-              <a:t>Watch Lecture 3 videos.</a:t>
-            </a:r>
-          </a:p>
-          <a:p>
-            <a:endParaRPr lang="en-US" dirty="0"/>
-          </a:p>
-          <a:p>
-            <a:pPr marL="0" indent="0">
-              <a:buNone/>
-            </a:pPr>
-            <a:r>
-              <a:rPr lang="en-US" b="1" dirty="0"/>
-              <a:t>* Make sure you email me your GitHub </a:t>
-            </a:r>
-            <a:r>
-              <a:rPr lang="en-US" b="1"/>
-              <a:t>account name.</a:t>
-            </a:r>
-            <a:endParaRPr lang="en-US" dirty="0"/>
-          </a:p>
-          <a:p>
-            <a:pPr marL="0" indent="0">
-              <a:buNone/>
-            </a:pPr>
-            <a:r>
-              <a:rPr lang="en-US" dirty="0"/>
-              <a:t>** </a:t>
-            </a:r>
-            <a:r>
-              <a:rPr lang="en-US" b="1" dirty="0"/>
-              <a:t>Remember to use Slack channel for questions</a:t>
-            </a:r>
-            <a:r>
-              <a:rPr lang="en-US" dirty="0"/>
-              <a:t>! </a:t>
-            </a:r>
-          </a:p>
-        </p:txBody>
-      </p:sp>
-      <p:pic>
-        <p:nvPicPr>
-          <p:cNvPr id="4" name="Picture 3"/>
-          <p:cNvPicPr>
-            <a:picLocks noChangeAspect="1"/>
-          </p:cNvPicPr>
-          <p:nvPr/>
-        </p:nvPicPr>
-        <p:blipFill>
-          <a:blip r:embed="rId2"/>
-          <a:stretch>
-            <a:fillRect/>
-          </a:stretch>
-        </p:blipFill>
-        <p:spPr>
-          <a:xfrm>
-            <a:off x="9417896" y="4085107"/>
-            <a:ext cx="859521" cy="859521"/>
-          </a:xfrm>
-          <a:prstGeom prst="rect">
-            <a:avLst/>
-          </a:prstGeom>
-        </p:spPr>
-      </p:pic>
-    </p:spTree>
-    <p:extLst>
-      <p:ext uri="{BB962C8B-B14F-4D97-AF65-F5344CB8AC3E}">
-        <p14:creationId xmlns:p14="http://schemas.microsoft.com/office/powerpoint/2010/main" val="2066220181"/>
-      </p:ext>
-    </p:extLst>
-  </p:cSld>
-  <p:clrMapOvr>
-    <a:masterClrMapping/>
-  </p:clrMapOvr>
-</p:sld>
-</file>
-
 <file path=ppt/slides/slide2.xml><?xml version="1.0" encoding="utf-8"?>
 <p:sld xmlns:a="http://schemas.openxmlformats.org/drawingml/2006/main" xmlns:r="http://schemas.openxmlformats.org/officeDocument/2006/relationships" xmlns:p="http://schemas.openxmlformats.org/presentationml/2006/main">
   <p:cSld>
@@ -3713,12 +3560,6 @@
             <a:r>
               <a:rPr lang="en-US" dirty="0"/>
               <a:t>Linux fundamentals</a:t>
-            </a:r>
-          </a:p>
-          <a:p>
-            <a:r>
-              <a:rPr lang="en-US" dirty="0"/>
-              <a:t>Launching a Linux instance on AWS</a:t>
             </a:r>
           </a:p>
           <a:p>
@@ -3889,15 +3730,7 @@
           <a:p>
             <a:r>
               <a:rPr lang="en-US" dirty="0"/>
-              <a:t>I will publish any assignment changes to </a:t>
-            </a:r>
-            <a:r>
-              <a:rPr lang="en-US" dirty="0" err="1"/>
-              <a:t>Github</a:t>
-            </a:r>
-            <a:r>
-              <a:rPr lang="en-US" dirty="0"/>
-              <a:t> and Slack.</a:t>
+              <a:t>I will publish any assignment changes to GitHub and Slack.</a:t>
             </a:r>
           </a:p>
           <a:p>
@@ -4651,7 +4484,15 @@
             <a:pPr lvl="1"/>
             <a:r>
               <a:rPr lang="en-US" dirty="0"/>
-              <a:t>Install new service: yum install </a:t>
+              <a:t>Install new service: </a:t>
+            </a:r>
+            <a:r>
+              <a:rPr lang="en-US" dirty="0" err="1"/>
+              <a:t>sudo</a:t>
+            </a:r>
+            <a:r>
+              <a:rPr lang="en-US" dirty="0"/>
+              <a:t> yum install </a:t>
             </a:r>
             <a:r>
               <a:rPr lang="en-US" dirty="0" err="1"/>
@@ -4663,7 +4504,15 @@
             <a:pPr lvl="1"/>
             <a:r>
               <a:rPr lang="en-US" dirty="0"/>
-              <a:t>Start service: service start </a:t>
+              <a:t>Start service: </a:t>
+            </a:r>
+            <a:r>
+              <a:rPr lang="en-US" dirty="0" err="1"/>
+              <a:t>sudo</a:t>
+            </a:r>
+            <a:r>
+              <a:rPr lang="en-US" dirty="0"/>
+              <a:t> service start </a:t>
             </a:r>
             <a:r>
               <a:rPr lang="en-US" dirty="0" err="1"/>
@@ -4712,7 +4561,7 @@
           <p:cNvPr id="2" name="Title 1">
             <a:extLst>
               <a:ext uri="{FF2B5EF4-FFF2-40B4-BE49-F238E27FC236}">
-                <a16:creationId xmlns:a16="http://schemas.microsoft.com/office/drawing/2014/main" id="{23C798AC-C83E-4D42-9069-65F21DAFDA58}"/>
+                <a16:creationId xmlns:a16="http://schemas.microsoft.com/office/drawing/2014/main" id="{B9396E93-B093-A14B-B3CA-BF43E8441E14}"/>
               </a:ext>
             </a:extLst>
           </p:cNvPr>
@@ -4730,7 +4579,7 @@
           <a:p>
             <a:r>
               <a:rPr lang="en-US" dirty="0"/>
-              <a:t>Launching an EC2 instance</a:t>
+              <a:t>Classroom project</a:t>
             </a:r>
           </a:p>
         </p:txBody>
@@ -4740,7 +4589,7 @@
           <p:cNvPr id="3" name="Content Placeholder 2">
             <a:extLst>
               <a:ext uri="{FF2B5EF4-FFF2-40B4-BE49-F238E27FC236}">
-                <a16:creationId xmlns:a16="http://schemas.microsoft.com/office/drawing/2014/main" id="{58C16431-10DD-B949-A16E-54F04004412C}"/>
+                <a16:creationId xmlns:a16="http://schemas.microsoft.com/office/drawing/2014/main" id="{E5096A85-5219-D442-A525-F0D4BD82BD71}"/>
               </a:ext>
             </a:extLst>
           </p:cNvPr>
@@ -4751,90 +4600,77 @@
             <p:ph idx="1"/>
           </p:nvPr>
         </p:nvSpPr>
-        <p:spPr>
-          <a:xfrm>
-            <a:off x="838199" y="1825625"/>
-            <a:ext cx="11110993" cy="4351338"/>
-          </a:xfrm>
-        </p:spPr>
+        <p:spPr/>
         <p:txBody>
           <a:bodyPr>
-            <a:normAutofit/>
+            <a:normAutofit lnSpcReduction="10000"/>
           </a:bodyPr>
           <a:lstStyle/>
           <a:p>
             <a:r>
-              <a:rPr lang="en-US" sz="2400" dirty="0"/>
-              <a:t>Accessing EC2 instance from a Windows PC: </a:t>
+              <a:rPr lang="en-US" dirty="0"/>
+              <a:t>Attendance</a:t>
+            </a:r>
+          </a:p>
+          <a:p>
+            <a:endParaRPr lang="en-US" dirty="0"/>
+          </a:p>
+          <a:p>
+            <a:r>
+              <a:rPr lang="en-US" dirty="0"/>
+              <a:t>Hands-on Linux and Git exercise.</a:t>
+            </a:r>
+          </a:p>
+          <a:p>
+            <a:endParaRPr lang="en-US" dirty="0"/>
+          </a:p>
+          <a:p>
+            <a:r>
+              <a:rPr lang="en-US" dirty="0"/>
+              <a:t>You must have:</a:t>
             </a:r>
           </a:p>
           <a:p>
             <a:pPr lvl="1"/>
             <a:r>
               <a:rPr lang="en-US" dirty="0"/>
-              <a:t>Must have SSH terminal program installed </a:t>
+              <a:t>AWS account</a:t>
+            </a:r>
+          </a:p>
+          <a:p>
+            <a:pPr lvl="1"/>
+            <a:r>
+              <a:rPr lang="en-US" dirty="0"/>
+              <a:t>GitHub account</a:t>
+            </a:r>
+          </a:p>
+          <a:p>
+            <a:pPr lvl="1"/>
+            <a:r>
+              <a:rPr lang="en-US" dirty="0"/>
+              <a:t>Remote terminal software installed:</a:t>
             </a:r>
           </a:p>
           <a:p>
             <a:pPr lvl="2"/>
             <a:r>
-              <a:rPr lang="en-US" sz="2400" dirty="0" err="1"/>
-              <a:t>PuTTY</a:t>
-            </a:r>
-            <a:r>
-              <a:rPr lang="en-US" sz="2400" dirty="0"/>
-              <a:t>: </a:t>
-            </a:r>
-            <a:r>
-              <a:rPr lang="en-US" sz="2400" dirty="0">
-                <a:hlinkClick r:id="rId2"/>
-              </a:rPr>
-              <a:t>https://www.chiark.greenend.org.uk/~sgtatham/putty/</a:t>
-            </a:r>
-            <a:endParaRPr lang="en-US" sz="2400" dirty="0"/>
-          </a:p>
-          <a:p>
-            <a:pPr lvl="1"/>
-            <a:r>
-              <a:rPr lang="en-US" dirty="0">
-                <a:hlinkClick r:id="rId3"/>
-              </a:rPr>
-              <a:t>https://youtu.be/HOlo7L9fWlc</a:t>
-            </a:r>
-            <a:endParaRPr lang="en-US" dirty="0"/>
-          </a:p>
-          <a:p>
-            <a:endParaRPr lang="en-US" sz="2400" dirty="0"/>
-          </a:p>
-          <a:p>
-            <a:r>
-              <a:rPr lang="en-US" sz="2400" dirty="0"/>
-              <a:t>Accessing EC2 instance from a Mac: </a:t>
-            </a:r>
-          </a:p>
-          <a:p>
-            <a:pPr lvl="1"/>
-            <a:r>
-              <a:rPr lang="en-US" sz="2000" dirty="0"/>
-              <a:t>Recommend using iterm2 software (https://www.iterm2.com/)</a:t>
-            </a:r>
-          </a:p>
-          <a:p>
-            <a:pPr lvl="1"/>
-            <a:r>
-              <a:rPr lang="en-US" sz="2000" dirty="0">
-                <a:hlinkClick r:id="rId4"/>
-              </a:rPr>
-              <a:t>https://youtu.be/ZFh-qA5DT6w</a:t>
-            </a:r>
-            <a:endParaRPr lang="en-US" sz="2000" dirty="0"/>
+              <a:rPr lang="en-US" dirty="0"/>
+              <a:t>Windows: Git for Windows</a:t>
+            </a:r>
+          </a:p>
+          <a:p>
+            <a:pPr lvl="2"/>
+            <a:r>
+              <a:rPr lang="en-US" dirty="0"/>
+              <a:t>Mac: iTerm2</a:t>
+            </a:r>
           </a:p>
         </p:txBody>
       </p:sp>
     </p:spTree>
     <p:extLst>
       <p:ext uri="{BB962C8B-B14F-4D97-AF65-F5344CB8AC3E}">
-        <p14:creationId xmlns:p14="http://schemas.microsoft.com/office/powerpoint/2010/main" val="175430078"/>
+        <p14:creationId xmlns:p14="http://schemas.microsoft.com/office/powerpoint/2010/main" val="340917574"/>
       </p:ext>
     </p:extLst>
   </p:cSld>
@@ -4863,13 +4699,7 @@
       </p:grpSpPr>
       <p:sp>
         <p:nvSpPr>
-          <p:cNvPr id="2" name="Title 1">
-            <a:extLst>
-              <a:ext uri="{FF2B5EF4-FFF2-40B4-BE49-F238E27FC236}">
-                <a16:creationId xmlns:a16="http://schemas.microsoft.com/office/drawing/2014/main" id="{B9396E93-B093-A14B-B3CA-BF43E8441E14}"/>
-              </a:ext>
-            </a:extLst>
-          </p:cNvPr>
+          <p:cNvPr id="2" name="Title 1"/>
           <p:cNvSpPr>
             <a:spLocks noGrp="1"/>
           </p:cNvSpPr>
@@ -4884,20 +4714,14 @@
           <a:p>
             <a:r>
               <a:rPr lang="en-US" dirty="0"/>
-              <a:t>Classroom project</a:t>
-            </a:r>
-          </a:p>
-        </p:txBody>
-      </p:sp>
-      <p:sp>
-        <p:nvSpPr>
-          <p:cNvPr id="3" name="Content Placeholder 2">
-            <a:extLst>
-              <a:ext uri="{FF2B5EF4-FFF2-40B4-BE49-F238E27FC236}">
-                <a16:creationId xmlns:a16="http://schemas.microsoft.com/office/drawing/2014/main" id="{E5096A85-5219-D442-A525-F0D4BD82BD71}"/>
-              </a:ext>
-            </a:extLst>
-          </p:cNvPr>
+              <a:t>Homework</a:t>
+            </a:r>
+          </a:p>
+        </p:txBody>
+      </p:sp>
+      <p:sp>
+        <p:nvSpPr>
+          <p:cNvPr id="3" name="Content Placeholder 2"/>
           <p:cNvSpPr>
             <a:spLocks noGrp="1"/>
           </p:cNvSpPr>
@@ -4912,62 +4736,89 @@
           <a:p>
             <a:r>
               <a:rPr lang="en-US" dirty="0"/>
-              <a:t>Attendance</a:t>
-            </a:r>
-          </a:p>
-          <a:p>
-            <a:endParaRPr lang="en-US"/>
-          </a:p>
-          <a:p>
-            <a:r>
-              <a:rPr lang="en-US"/>
-              <a:t>Hands-on </a:t>
-            </a:r>
-            <a:r>
-              <a:rPr lang="en-US" dirty="0"/>
-              <a:t>Linux and Git exercise.</a:t>
+              <a:t>Assignment 2: Shell scripting</a:t>
+            </a:r>
+          </a:p>
+          <a:p>
+            <a:r>
+              <a:rPr lang="en-US" dirty="0"/>
+              <a:t>Read </a:t>
+            </a:r>
+            <a:r>
+              <a:rPr lang="en-US" i="1" dirty="0"/>
+              <a:t>Infrastructure as Code </a:t>
+            </a:r>
+            <a:r>
+              <a:rPr lang="en-US" dirty="0"/>
+              <a:t>Chapters 1 &amp; 2</a:t>
+            </a:r>
+          </a:p>
+          <a:p>
+            <a:r>
+              <a:rPr lang="en-US" dirty="0"/>
+              <a:t>Watch Lecture 3 videos.</a:t>
             </a:r>
           </a:p>
           <a:p>
             <a:endParaRPr lang="en-US" dirty="0"/>
           </a:p>
           <a:p>
-            <a:r>
-              <a:rPr lang="en-US" dirty="0"/>
-              <a:t>You must have:</a:t>
-            </a:r>
-          </a:p>
-          <a:p>
-            <a:pPr lvl="1"/>
-            <a:r>
-              <a:rPr lang="en-US" dirty="0"/>
-              <a:t>AWS account</a:t>
-            </a:r>
-          </a:p>
-          <a:p>
-            <a:pPr lvl="1"/>
-            <a:r>
-              <a:rPr lang="en-US" dirty="0" err="1"/>
-              <a:t>Github</a:t>
-            </a:r>
-            <a:r>
-              <a:rPr lang="en-US" dirty="0"/>
-              <a:t> account</a:t>
-            </a:r>
-          </a:p>
-          <a:p>
-            <a:pPr lvl="1"/>
-            <a:r>
-              <a:rPr lang="en-US" dirty="0"/>
-              <a:t>Putty/ iterm2 installed</a:t>
-            </a:r>
-          </a:p>
-        </p:txBody>
-      </p:sp>
+            <a:pPr marL="0" indent="0">
+              <a:buNone/>
+            </a:pPr>
+            <a:r>
+              <a:rPr lang="en-US" b="1" dirty="0"/>
+              <a:t>* Make sure you email me your GitHub account name.</a:t>
+            </a:r>
+            <a:endParaRPr lang="en-US" dirty="0"/>
+          </a:p>
+          <a:p>
+            <a:pPr marL="0" indent="0">
+              <a:buNone/>
+            </a:pPr>
+            <a:r>
+              <a:rPr lang="en-US" dirty="0"/>
+              <a:t>** </a:t>
+            </a:r>
+            <a:r>
+              <a:rPr lang="en-US" b="1" dirty="0"/>
+              <a:t>Remember to use Slack channel for questions</a:t>
+            </a:r>
+            <a:r>
+              <a:rPr lang="en-US" dirty="0"/>
+              <a:t>! </a:t>
+            </a:r>
+          </a:p>
+        </p:txBody>
+      </p:sp>
+      <p:pic>
+        <p:nvPicPr>
+          <p:cNvPr id="4" name="Picture 3"/>
+          <p:cNvPicPr>
+            <a:picLocks noChangeAspect="1"/>
+          </p:cNvPicPr>
+          <p:nvPr/>
+        </p:nvPicPr>
+        <p:blipFill>
+          <a:blip r:embed="rId2"/>
+          <a:stretch>
+            <a:fillRect/>
+          </a:stretch>
+        </p:blipFill>
+        <p:spPr>
+          <a:xfrm>
+            <a:off x="9417896" y="4085107"/>
+            <a:ext cx="859521" cy="859521"/>
+          </a:xfrm>
+          <a:prstGeom prst="rect">
+            <a:avLst/>
+          </a:prstGeom>
+        </p:spPr>
+      </p:pic>
     </p:spTree>
     <p:extLst>
       <p:ext uri="{BB962C8B-B14F-4D97-AF65-F5344CB8AC3E}">
-        <p14:creationId xmlns:p14="http://schemas.microsoft.com/office/powerpoint/2010/main" val="340917574"/>
+        <p14:creationId xmlns:p14="http://schemas.microsoft.com/office/powerpoint/2010/main" val="2066220181"/>
       </p:ext>
     </p:extLst>
   </p:cSld>

</xml_diff>